<commit_message>
small changes to lectures #14 and #15
</commit_message>
<xml_diff>
--- a/classes/stats2015/Lecture15.pptx
+++ b/classes/stats2015/Lecture15.pptx
@@ -228,7 +228,7 @@
             <a:fld id="{897BA819-6E69-4C95-9425-B1A17AA83B4D}" type="datetimeFigureOut">
               <a:rPr lang="en-US" smtClean="0"/>
               <a:pPr/>
-              <a:t>4/11/2014</a:t>
+              <a:t>3/27/2015</a:t>
             </a:fld>
             <a:endParaRPr lang="en-US"/>
           </a:p>
@@ -3464,7 +3464,7 @@
             <a:fld id="{1D8BD707-D9CF-40AE-B4C6-C98DA3205C09}" type="datetimeFigureOut">
               <a:rPr lang="en-US" smtClean="0"/>
               <a:pPr/>
-              <a:t>4/11/2014</a:t>
+              <a:t>3/27/2015</a:t>
             </a:fld>
             <a:endParaRPr lang="en-US"/>
           </a:p>
@@ -3631,7 +3631,7 @@
             <a:fld id="{1D8BD707-D9CF-40AE-B4C6-C98DA3205C09}" type="datetimeFigureOut">
               <a:rPr lang="en-US" smtClean="0"/>
               <a:pPr/>
-              <a:t>4/11/2014</a:t>
+              <a:t>3/27/2015</a:t>
             </a:fld>
             <a:endParaRPr lang="en-US"/>
           </a:p>
@@ -3808,7 +3808,7 @@
             <a:fld id="{1D8BD707-D9CF-40AE-B4C6-C98DA3205C09}" type="datetimeFigureOut">
               <a:rPr lang="en-US" smtClean="0"/>
               <a:pPr/>
-              <a:t>4/11/2014</a:t>
+              <a:t>3/27/2015</a:t>
             </a:fld>
             <a:endParaRPr lang="en-US"/>
           </a:p>
@@ -3975,7 +3975,7 @@
             <a:fld id="{1D8BD707-D9CF-40AE-B4C6-C98DA3205C09}" type="datetimeFigureOut">
               <a:rPr lang="en-US" smtClean="0"/>
               <a:pPr/>
-              <a:t>4/11/2014</a:t>
+              <a:t>3/27/2015</a:t>
             </a:fld>
             <a:endParaRPr lang="en-US"/>
           </a:p>
@@ -4218,7 +4218,7 @@
             <a:fld id="{1D8BD707-D9CF-40AE-B4C6-C98DA3205C09}" type="datetimeFigureOut">
               <a:rPr lang="en-US" smtClean="0"/>
               <a:pPr/>
-              <a:t>4/11/2014</a:t>
+              <a:t>3/27/2015</a:t>
             </a:fld>
             <a:endParaRPr lang="en-US"/>
           </a:p>
@@ -4503,7 +4503,7 @@
             <a:fld id="{1D8BD707-D9CF-40AE-B4C6-C98DA3205C09}" type="datetimeFigureOut">
               <a:rPr lang="en-US" smtClean="0"/>
               <a:pPr/>
-              <a:t>4/11/2014</a:t>
+              <a:t>3/27/2015</a:t>
             </a:fld>
             <a:endParaRPr lang="en-US"/>
           </a:p>
@@ -4922,7 +4922,7 @@
             <a:fld id="{1D8BD707-D9CF-40AE-B4C6-C98DA3205C09}" type="datetimeFigureOut">
               <a:rPr lang="en-US" smtClean="0"/>
               <a:pPr/>
-              <a:t>4/11/2014</a:t>
+              <a:t>3/27/2015</a:t>
             </a:fld>
             <a:endParaRPr lang="en-US"/>
           </a:p>
@@ -5037,7 +5037,7 @@
             <a:fld id="{1D8BD707-D9CF-40AE-B4C6-C98DA3205C09}" type="datetimeFigureOut">
               <a:rPr lang="en-US" smtClean="0"/>
               <a:pPr/>
-              <a:t>4/11/2014</a:t>
+              <a:t>3/27/2015</a:t>
             </a:fld>
             <a:endParaRPr lang="en-US"/>
           </a:p>
@@ -5129,7 +5129,7 @@
             <a:fld id="{1D8BD707-D9CF-40AE-B4C6-C98DA3205C09}" type="datetimeFigureOut">
               <a:rPr lang="en-US" smtClean="0"/>
               <a:pPr/>
-              <a:t>4/11/2014</a:t>
+              <a:t>3/27/2015</a:t>
             </a:fld>
             <a:endParaRPr lang="en-US"/>
           </a:p>
@@ -5403,7 +5403,7 @@
             <a:fld id="{1D8BD707-D9CF-40AE-B4C6-C98DA3205C09}" type="datetimeFigureOut">
               <a:rPr lang="en-US" smtClean="0"/>
               <a:pPr/>
-              <a:t>4/11/2014</a:t>
+              <a:t>3/27/2015</a:t>
             </a:fld>
             <a:endParaRPr lang="en-US"/>
           </a:p>
@@ -5653,7 +5653,7 @@
             <a:fld id="{1D8BD707-D9CF-40AE-B4C6-C98DA3205C09}" type="datetimeFigureOut">
               <a:rPr lang="en-US" smtClean="0"/>
               <a:pPr/>
-              <a:t>4/11/2014</a:t>
+              <a:t>3/27/2015</a:t>
             </a:fld>
             <a:endParaRPr lang="en-US"/>
           </a:p>
@@ -5863,7 +5863,7 @@
             <a:fld id="{1D8BD707-D9CF-40AE-B4C6-C98DA3205C09}" type="datetimeFigureOut">
               <a:rPr lang="en-US" smtClean="0"/>
               <a:pPr/>
-              <a:t>4/11/2014</a:t>
+              <a:t>3/27/2015</a:t>
             </a:fld>
             <a:endParaRPr lang="en-US"/>
           </a:p>
@@ -6481,6 +6481,46 @@
           </a:p>
         </p:txBody>
       </p:sp>
+      <p:sp>
+        <p:nvSpPr>
+          <p:cNvPr id="6" name="TextBox 5"/>
+          <p:cNvSpPr txBox="1"/>
+          <p:nvPr/>
+        </p:nvSpPr>
+        <p:spPr>
+          <a:xfrm>
+            <a:off x="914400" y="5410200"/>
+            <a:ext cx="4475521" cy="646331"/>
+          </a:xfrm>
+          <a:prstGeom prst="rect">
+            <a:avLst/>
+          </a:prstGeom>
+          <a:noFill/>
+        </p:spPr>
+        <p:txBody>
+          <a:bodyPr wrap="none" rtlCol="0">
+            <a:spAutoFit/>
+          </a:bodyPr>
+          <a:lstStyle/>
+          <a:p>
+            <a:r>
+              <a:rPr lang="en-US" dirty="0" err="1" smtClean="0"/>
+              <a:t>Neter</a:t>
+            </a:r>
+            <a:r>
+              <a:rPr lang="en-US" dirty="0" smtClean="0"/>
+              <a:t> et al - </a:t>
+            </a:r>
+            <a:r>
+              <a:rPr lang="en-US" b="1" dirty="0" smtClean="0"/>
+              <a:t>Applied Linear Statistical Models</a:t>
+            </a:r>
+          </a:p>
+          <a:p>
+            <a:endParaRPr lang="en-US" dirty="0"/>
+          </a:p>
+        </p:txBody>
+      </p:sp>
     </p:spTree>
   </p:cSld>
   <p:clrMapOvr>
@@ -8252,14 +8292,14 @@
       </p:sp>
       <p:sp>
         <p:nvSpPr>
-          <p:cNvPr id="14" name="TextBox 13"/>
+          <p:cNvPr id="12" name="TextBox 11"/>
           <p:cNvSpPr txBox="1"/>
           <p:nvPr/>
         </p:nvSpPr>
         <p:spPr>
           <a:xfrm>
-            <a:off x="5257800" y="152400"/>
-            <a:ext cx="2316083" cy="369332"/>
+            <a:off x="4038600" y="0"/>
+            <a:ext cx="4475521" cy="646331"/>
           </a:xfrm>
           <a:prstGeom prst="rect">
             <a:avLst/>
@@ -8273,17 +8313,19 @@
           <a:lstStyle/>
           <a:p>
             <a:r>
-              <a:rPr lang="en-US" dirty="0" smtClean="0"/>
-              <a:t>(</a:t>
-            </a:r>
-            <a:r>
               <a:rPr lang="en-US" dirty="0" err="1" smtClean="0"/>
               <a:t>Neter</a:t>
             </a:r>
             <a:r>
               <a:rPr lang="en-US" dirty="0" smtClean="0"/>
-              <a:t> et al. text book)</a:t>
-            </a:r>
+              <a:t> et al - </a:t>
+            </a:r>
+            <a:r>
+              <a:rPr lang="en-US" b="1" dirty="0" smtClean="0"/>
+              <a:t>Applied Linear Statistical Models</a:t>
+            </a:r>
+          </a:p>
+          <a:p>
             <a:endParaRPr lang="en-US" dirty="0"/>
           </a:p>
         </p:txBody>
@@ -11139,7 +11181,15 @@
           <a:p>
             <a:r>
               <a:rPr lang="en-US" dirty="0" smtClean="0"/>
-              <a:t>So consider a two samples (weight of mice on Drug A vs. Drug B)</a:t>
+              <a:t>So consider </a:t>
+            </a:r>
+            <a:r>
+              <a:rPr lang="en-US" dirty="0" smtClean="0"/>
+              <a:t>two </a:t>
+            </a:r>
+            <a:r>
+              <a:rPr lang="en-US" dirty="0" smtClean="0"/>
+              <a:t>samples (weight of mice on Drug A vs. Drug B)</a:t>
             </a:r>
           </a:p>
           <a:p>
@@ -15026,11 +15076,7 @@
           <a:p>
             <a:r>
               <a:rPr lang="en-US" dirty="0" smtClean="0"/>
-              <a:t>Proof!  From Brittany </a:t>
-            </a:r>
-            <a:r>
-              <a:rPr lang="en-US" dirty="0" smtClean="0"/>
-              <a:t>Smith</a:t>
+              <a:t>Proof!  From Brittany Smith</a:t>
             </a:r>
             <a:endParaRPr lang="en-US" dirty="0"/>
           </a:p>

</xml_diff>